<commit_message>
near final version with one thing to debug
</commit_message>
<xml_diff>
--- a/PCBA allocation Sep 29.pptx
+++ b/PCBA allocation Sep 29.pptx
@@ -229,7 +229,7 @@
           <a:p>
             <a:fld id="{055D18FD-D4CC-4163-B221-261AEA246121}" type="datetimeFigureOut">
               <a:rPr lang="en-US" smtClean="0"/>
-              <a:t>10/9/20</a:t>
+              <a:t>10/10/20</a:t>
             </a:fld>
             <a:endParaRPr lang="en-US"/>
           </a:p>
@@ -20088,7 +20088,7 @@
         <p:spPr>
           <a:xfrm>
             <a:off x="625995" y="2162832"/>
-            <a:ext cx="11426745" cy="1429030"/>
+            <a:ext cx="10589693" cy="1429030"/>
           </a:xfrm>
         </p:spPr>
         <p:txBody>
@@ -20105,7 +20105,7 @@
             </a:br>
             <a:r>
               <a:rPr lang="en-US" altLang="zh-CN" sz="2400" dirty="0"/>
-              <a:t>Ranking Logic and Procedure</a:t>
+              <a:t>Ranking Logic and Allocation Procedures</a:t>
             </a:r>
             <a:endParaRPr lang="en-US" sz="3200" dirty="0"/>
           </a:p>
@@ -21033,8 +21033,8 @@
         </p:nvSpPr>
         <p:spPr>
           <a:xfrm>
-            <a:off x="3729525" y="1399349"/>
-            <a:ext cx="2985882" cy="307777"/>
+            <a:off x="3445748" y="1399349"/>
+            <a:ext cx="3316614" cy="307777"/>
           </a:xfrm>
           <a:prstGeom prst="rect">
             <a:avLst/>
@@ -21049,7 +21049,7 @@
           <a:p>
             <a:r>
               <a:rPr lang="en-CN" sz="1400" dirty="0"/>
-              <a:t>(PCBA LT to DF will be considered)</a:t>
+              <a:t>(date offset by PCBA to DF transit time)</a:t>
             </a:r>
           </a:p>
         </p:txBody>
@@ -21096,11 +21096,117 @@
             </a:r>
             <a:r>
               <a:rPr lang="en-CN" dirty="0"/>
-              <a:t> (further confirm)</a:t>
-            </a:r>
-          </a:p>
-        </p:txBody>
-      </p:sp>
+              <a:t> (Ann is shared)</a:t>
+            </a:r>
+          </a:p>
+        </p:txBody>
+      </p:sp>
+      <p:sp>
+        <p:nvSpPr>
+          <p:cNvPr id="21" name="Process 20">
+            <a:extLst>
+              <a:ext uri="{FF2B5EF4-FFF2-40B4-BE49-F238E27FC236}">
+                <a16:creationId xmlns:a16="http://schemas.microsoft.com/office/drawing/2014/main" id="{64C36445-2FBB-1841-A5AC-74A47F9C4300}"/>
+              </a:ext>
+            </a:extLst>
+          </p:cNvPr>
+          <p:cNvSpPr/>
+          <p:nvPr/>
+        </p:nvSpPr>
+        <p:spPr>
+          <a:xfrm>
+            <a:off x="2893017" y="2988390"/>
+            <a:ext cx="1176549" cy="614849"/>
+          </a:xfrm>
+          <a:prstGeom prst="flowChartProcess">
+            <a:avLst/>
+          </a:prstGeom>
+          <a:noFill/>
+          <a:ln>
+            <a:solidFill>
+              <a:srgbClr val="FFC000"/>
+            </a:solidFill>
+          </a:ln>
+          <a:effectLst/>
+        </p:spPr>
+        <p:style>
+          <a:lnRef idx="2">
+            <a:schemeClr val="accent1">
+              <a:shade val="50000"/>
+            </a:schemeClr>
+          </a:lnRef>
+          <a:fillRef idx="1">
+            <a:schemeClr val="accent1"/>
+          </a:fillRef>
+          <a:effectRef idx="0">
+            <a:schemeClr val="accent1"/>
+          </a:effectRef>
+          <a:fontRef idx="minor">
+            <a:schemeClr val="lt1"/>
+          </a:fontRef>
+        </p:style>
+        <p:txBody>
+          <a:bodyPr rtlCol="0" anchor="ctr"/>
+          <a:lstStyle/>
+          <a:p>
+            <a:pPr algn="ctr"/>
+            <a:r>
+              <a:rPr lang="en-CN" sz="1050" dirty="0">
+                <a:solidFill>
+                  <a:schemeClr val="tx1"/>
+                </a:solidFill>
+              </a:rPr>
+              <a:t>Manual priority injection by PPF</a:t>
+            </a:r>
+          </a:p>
+        </p:txBody>
+      </p:sp>
+      <p:cxnSp>
+        <p:nvCxnSpPr>
+          <p:cNvPr id="22" name="Elbow Connector 21">
+            <a:extLst>
+              <a:ext uri="{FF2B5EF4-FFF2-40B4-BE49-F238E27FC236}">
+                <a16:creationId xmlns:a16="http://schemas.microsoft.com/office/drawing/2014/main" id="{CEE62B35-6228-7743-AFAB-D84FF5CAC211}"/>
+              </a:ext>
+            </a:extLst>
+          </p:cNvPr>
+          <p:cNvCxnSpPr>
+            <a:cxnSpLocks/>
+            <a:stCxn id="21" idx="1"/>
+          </p:cNvCxnSpPr>
+          <p:nvPr/>
+        </p:nvCxnSpPr>
+        <p:spPr>
+          <a:xfrm rot="10800000">
+            <a:off x="2574429" y="2307171"/>
+            <a:ext cx="318589" cy="988645"/>
+          </a:xfrm>
+          <a:prstGeom prst="bentConnector2">
+            <a:avLst/>
+          </a:prstGeom>
+          <a:ln w="19050">
+            <a:solidFill>
+              <a:srgbClr val="FFC000"/>
+            </a:solidFill>
+            <a:prstDash val="dashDot"/>
+            <a:tailEnd type="triangle"/>
+          </a:ln>
+        </p:spPr>
+        <p:style>
+          <a:lnRef idx="1">
+            <a:schemeClr val="accent1"/>
+          </a:lnRef>
+          <a:fillRef idx="0">
+            <a:schemeClr val="accent1"/>
+          </a:fillRef>
+          <a:effectRef idx="0">
+            <a:schemeClr val="accent1"/>
+          </a:effectRef>
+          <a:fontRef idx="minor">
+            <a:schemeClr val="tx1"/>
+          </a:fontRef>
+        </p:style>
+      </p:cxnSp>
     </p:spTree>
     <p:extLst>
       <p:ext uri="{BB962C8B-B14F-4D97-AF65-F5344CB8AC3E}">
@@ -21279,7 +21385,7 @@
             <a:pPr algn="ctr"/>
             <a:r>
               <a:rPr lang="en-CN" sz="1100" dirty="0"/>
-              <a:t>SCR (incl. SM)</a:t>
+              <a:t>SCR (incl. OH)</a:t>
             </a:r>
           </a:p>
         </p:txBody>
@@ -22210,7 +22316,7 @@
         <p:spPr>
           <a:xfrm>
             <a:off x="4694501" y="6033583"/>
-            <a:ext cx="5563511" cy="738664"/>
+            <a:ext cx="5826980" cy="738664"/>
           </a:xfrm>
           <a:prstGeom prst="rect">
             <a:avLst/>
@@ -22227,7 +22333,7 @@
           <a:p>
             <a:r>
               <a:rPr lang="en-CN" sz="1400" dirty="0"/>
-              <a:t>Versions: no need to separate different versions</a:t>
+              <a:t>Versions: different versions considered as same</a:t>
             </a:r>
           </a:p>
           <a:p>
@@ -22239,7 +22345,7 @@
           <a:p>
             <a:r>
               <a:rPr lang="en-CN" sz="1400" dirty="0"/>
-              <a:t>Backlog gap:  use air ship from PCBA site to cover </a:t>
+              <a:t>Transit time: air transit time – backlog gap should be covered by air ship</a:t>
             </a:r>
           </a:p>
         </p:txBody>
@@ -22294,11 +22400,7 @@
           <a:p>
             <a:pPr algn="ctr"/>
             <a:r>
-              <a:rPr lang="en-CN" sz="1100" dirty="0">
-                <a:highlight>
-                  <a:srgbClr val="FFC080"/>
-                </a:highlight>
-              </a:rPr>
+              <a:rPr lang="en-CN" sz="1100" dirty="0"/>
               <a:t>SB</a:t>
             </a:r>
           </a:p>
@@ -22362,7 +22464,7 @@
         <p:spPr>
           <a:xfrm>
             <a:off x="3058501" y="5993156"/>
-            <a:ext cx="1762021" cy="369332"/>
+            <a:ext cx="1569660" cy="369332"/>
           </a:xfrm>
           <a:prstGeom prst="rect">
             <a:avLst/>
@@ -22377,17 +22479,17 @@
           <a:p>
             <a:r>
               <a:rPr lang="en-CN" dirty="0"/>
-              <a:t>Assummptions:</a:t>
-            </a:r>
-          </a:p>
-        </p:txBody>
-      </p:sp>
-      <p:sp>
-        <p:nvSpPr>
-          <p:cNvPr id="3" name="TextBox 2">
+              <a:t>Assumptions:</a:t>
+            </a:r>
+          </a:p>
+        </p:txBody>
+      </p:sp>
+      <p:sp>
+        <p:nvSpPr>
+          <p:cNvPr id="31" name="TextBox 30">
             <a:extLst>
               <a:ext uri="{FF2B5EF4-FFF2-40B4-BE49-F238E27FC236}">
-                <a16:creationId xmlns:a16="http://schemas.microsoft.com/office/drawing/2014/main" id="{C9110377-6477-EE45-9EC3-5915185D1520}"/>
+                <a16:creationId xmlns:a16="http://schemas.microsoft.com/office/drawing/2014/main" id="{2773AE47-D6B4-6F42-BBF1-A5883D416888}"/>
               </a:ext>
             </a:extLst>
           </p:cNvPr>
@@ -22396,8 +22498,8 @@
         </p:nvSpPr>
         <p:spPr>
           <a:xfrm>
-            <a:off x="9249104" y="3128866"/>
-            <a:ext cx="2543503" cy="954107"/>
+            <a:off x="2430519" y="5020223"/>
+            <a:ext cx="2795958" cy="246221"/>
           </a:xfrm>
           <a:prstGeom prst="rect">
             <a:avLst/>
@@ -22405,34 +22507,49 @@
           <a:noFill/>
         </p:spPr>
         <p:txBody>
-          <a:bodyPr wrap="square" rtlCol="0">
+          <a:bodyPr wrap="none" rtlCol="0">
             <a:spAutoFit/>
           </a:bodyPr>
           <a:lstStyle/>
           <a:p>
             <a:r>
-              <a:rPr lang="en-CN" sz="1400" dirty="0"/>
-              <a:t>Questions: </a:t>
-            </a:r>
-          </a:p>
-          <a:p>
-            <a:pPr marL="285750" indent="-285750">
-              <a:buFont typeface="Arial" panose="020B0604020202020204" pitchFamily="34" charset="0"/>
-              <a:buChar char="•"/>
-            </a:pPr>
-            <a:r>
-              <a:rPr lang="en-CN" sz="1400" dirty="0"/>
-              <a:t>OH sheet, transit is from where to where?</a:t>
-            </a:r>
-          </a:p>
-          <a:p>
-            <a:pPr marL="285750" indent="-285750">
-              <a:buFont typeface="Arial" panose="020B0604020202020204" pitchFamily="34" charset="0"/>
-              <a:buChar char="•"/>
-            </a:pPr>
-            <a:r>
-              <a:rPr lang="en-CN" sz="1400" dirty="0"/>
-              <a:t>SB datasource?</a:t>
+              <a:rPr lang="en-CN" sz="1000" dirty="0"/>
+              <a:t>To be considered if we have good data source</a:t>
+            </a:r>
+          </a:p>
+        </p:txBody>
+      </p:sp>
+      <p:sp>
+        <p:nvSpPr>
+          <p:cNvPr id="33" name="TextBox 32">
+            <a:extLst>
+              <a:ext uri="{FF2B5EF4-FFF2-40B4-BE49-F238E27FC236}">
+                <a16:creationId xmlns:a16="http://schemas.microsoft.com/office/drawing/2014/main" id="{158DB9B5-DB86-E747-8B78-67938A7CEF49}"/>
+              </a:ext>
+            </a:extLst>
+          </p:cNvPr>
+          <p:cNvSpPr txBox="1"/>
+          <p:nvPr/>
+        </p:nvSpPr>
+        <p:spPr>
+          <a:xfrm>
+            <a:off x="2420006" y="4351357"/>
+            <a:ext cx="4549643" cy="246221"/>
+          </a:xfrm>
+          <a:prstGeom prst="rect">
+            <a:avLst/>
+          </a:prstGeom>
+          <a:noFill/>
+        </p:spPr>
+        <p:txBody>
+          <a:bodyPr wrap="none" rtlCol="0">
+            <a:spAutoFit/>
+          </a:bodyPr>
+          <a:lstStyle/>
+          <a:p>
+            <a:r>
+              <a:rPr lang="en-CN" sz="1000" dirty="0"/>
+              <a:t>ETA&lt;=15days considered as OH; ETA&gt;15days can backward fulfill by 7 days</a:t>
             </a:r>
           </a:p>
         </p:txBody>

</xml_diff>